<commit_message>
add logo CLINICAL GRAPHICS
</commit_message>
<xml_diff>
--- a/ppt/Object Detection in Medical Images_maria.pptx
+++ b/ppt/Object Detection in Medical Images_maria.pptx
@@ -7382,6 +7382,36 @@
           </a:p>
         </p:txBody>
       </p:sp>
+      <p:pic>
+        <p:nvPicPr>
+          <p:cNvPr id="2" name="Imagen 1"/>
+          <p:cNvPicPr>
+            <a:picLocks noChangeAspect="1"/>
+          </p:cNvPicPr>
+          <p:nvPr/>
+        </p:nvPicPr>
+        <p:blipFill>
+          <a:blip r:embed="rId2">
+            <a:extLst>
+              <a:ext uri="{28A0092B-C50C-407E-A947-70E740481C1C}">
+                <a14:useLocalDpi xmlns:a14="http://schemas.microsoft.com/office/drawing/2010/main" val="0"/>
+              </a:ext>
+            </a:extLst>
+          </a:blip>
+          <a:stretch>
+            <a:fillRect/>
+          </a:stretch>
+        </p:blipFill>
+        <p:spPr>
+          <a:xfrm>
+            <a:off x="3491880" y="5912044"/>
+            <a:ext cx="2857500" cy="895350"/>
+          </a:xfrm>
+          <a:prstGeom prst="rect">
+            <a:avLst/>
+          </a:prstGeom>
+        </p:spPr>
+      </p:pic>
     </p:spTree>
   </p:cSld>
   <p:clrMapOvr>
@@ -7529,6 +7559,36 @@
           <a:xfrm>
             <a:off x="1700213" y="1196752"/>
             <a:ext cx="5510741" cy="4133056"/>
+          </a:xfrm>
+          <a:prstGeom prst="rect">
+            <a:avLst/>
+          </a:prstGeom>
+        </p:spPr>
+      </p:pic>
+      <p:pic>
+        <p:nvPicPr>
+          <p:cNvPr id="7" name="Imagen 6"/>
+          <p:cNvPicPr>
+            <a:picLocks noChangeAspect="1"/>
+          </p:cNvPicPr>
+          <p:nvPr/>
+        </p:nvPicPr>
+        <p:blipFill>
+          <a:blip r:embed="rId3">
+            <a:extLst>
+              <a:ext uri="{28A0092B-C50C-407E-A947-70E740481C1C}">
+                <a14:useLocalDpi xmlns:a14="http://schemas.microsoft.com/office/drawing/2010/main" val="0"/>
+              </a:ext>
+            </a:extLst>
+          </a:blip>
+          <a:stretch>
+            <a:fillRect/>
+          </a:stretch>
+        </p:blipFill>
+        <p:spPr>
+          <a:xfrm>
+            <a:off x="4211960" y="6137668"/>
+            <a:ext cx="2137420" cy="669725"/>
           </a:xfrm>
           <a:prstGeom prst="rect">
             <a:avLst/>
@@ -7939,6 +7999,36 @@
           </a:p>
         </p:txBody>
       </p:sp>
+      <p:pic>
+        <p:nvPicPr>
+          <p:cNvPr id="6" name="Imagen 5"/>
+          <p:cNvPicPr>
+            <a:picLocks noChangeAspect="1"/>
+          </p:cNvPicPr>
+          <p:nvPr/>
+        </p:nvPicPr>
+        <p:blipFill>
+          <a:blip r:embed="rId2">
+            <a:extLst>
+              <a:ext uri="{28A0092B-C50C-407E-A947-70E740481C1C}">
+                <a14:useLocalDpi xmlns:a14="http://schemas.microsoft.com/office/drawing/2010/main" val="0"/>
+              </a:ext>
+            </a:extLst>
+          </a:blip>
+          <a:stretch>
+            <a:fillRect/>
+          </a:stretch>
+        </p:blipFill>
+        <p:spPr>
+          <a:xfrm>
+            <a:off x="4211960" y="6137668"/>
+            <a:ext cx="2137420" cy="669725"/>
+          </a:xfrm>
+          <a:prstGeom prst="rect">
+            <a:avLst/>
+          </a:prstGeom>
+        </p:spPr>
+      </p:pic>
     </p:spTree>
     <p:extLst>
       <p:ext uri="{BB962C8B-B14F-4D97-AF65-F5344CB8AC3E}">
@@ -8071,6 +8161,36 @@
             <a:avLst/>
           </a:prstGeom>
           <a:noFill/>
+        </p:spPr>
+      </p:pic>
+      <p:pic>
+        <p:nvPicPr>
+          <p:cNvPr id="6" name="Imagen 5"/>
+          <p:cNvPicPr>
+            <a:picLocks noChangeAspect="1"/>
+          </p:cNvPicPr>
+          <p:nvPr/>
+        </p:nvPicPr>
+        <p:blipFill>
+          <a:blip r:embed="rId3">
+            <a:extLst>
+              <a:ext uri="{28A0092B-C50C-407E-A947-70E740481C1C}">
+                <a14:useLocalDpi xmlns:a14="http://schemas.microsoft.com/office/drawing/2010/main" val="0"/>
+              </a:ext>
+            </a:extLst>
+          </a:blip>
+          <a:stretch>
+            <a:fillRect/>
+          </a:stretch>
+        </p:blipFill>
+        <p:spPr>
+          <a:xfrm>
+            <a:off x="4211960" y="6137668"/>
+            <a:ext cx="2137420" cy="669725"/>
+          </a:xfrm>
+          <a:prstGeom prst="rect">
+            <a:avLst/>
+          </a:prstGeom>
         </p:spPr>
       </p:pic>
     </p:spTree>
@@ -8529,6 +8649,36 @@
           </a:p>
         </p:txBody>
       </p:sp>
+      <p:pic>
+        <p:nvPicPr>
+          <p:cNvPr id="6" name="Imagen 5"/>
+          <p:cNvPicPr>
+            <a:picLocks noChangeAspect="1"/>
+          </p:cNvPicPr>
+          <p:nvPr/>
+        </p:nvPicPr>
+        <p:blipFill>
+          <a:blip r:embed="rId2">
+            <a:extLst>
+              <a:ext uri="{28A0092B-C50C-407E-A947-70E740481C1C}">
+                <a14:useLocalDpi xmlns:a14="http://schemas.microsoft.com/office/drawing/2010/main" val="0"/>
+              </a:ext>
+            </a:extLst>
+          </a:blip>
+          <a:stretch>
+            <a:fillRect/>
+          </a:stretch>
+        </p:blipFill>
+        <p:spPr>
+          <a:xfrm>
+            <a:off x="4211960" y="6137668"/>
+            <a:ext cx="2137420" cy="669725"/>
+          </a:xfrm>
+          <a:prstGeom prst="rect">
+            <a:avLst/>
+          </a:prstGeom>
+        </p:spPr>
+      </p:pic>
     </p:spTree>
     <p:extLst>
       <p:ext uri="{BB962C8B-B14F-4D97-AF65-F5344CB8AC3E}">
@@ -8688,6 +8838,36 @@
             <a:avLst/>
           </a:prstGeom>
           <a:noFill/>
+        </p:spPr>
+      </p:pic>
+      <p:pic>
+        <p:nvPicPr>
+          <p:cNvPr id="7" name="Imagen 6"/>
+          <p:cNvPicPr>
+            <a:picLocks noChangeAspect="1"/>
+          </p:cNvPicPr>
+          <p:nvPr/>
+        </p:nvPicPr>
+        <p:blipFill>
+          <a:blip r:embed="rId3">
+            <a:extLst>
+              <a:ext uri="{28A0092B-C50C-407E-A947-70E740481C1C}">
+                <a14:useLocalDpi xmlns:a14="http://schemas.microsoft.com/office/drawing/2010/main" val="0"/>
+              </a:ext>
+            </a:extLst>
+          </a:blip>
+          <a:stretch>
+            <a:fillRect/>
+          </a:stretch>
+        </p:blipFill>
+        <p:spPr>
+          <a:xfrm>
+            <a:off x="4211960" y="6137668"/>
+            <a:ext cx="2137420" cy="669725"/>
+          </a:xfrm>
+          <a:prstGeom prst="rect">
+            <a:avLst/>
+          </a:prstGeom>
         </p:spPr>
       </p:pic>
     </p:spTree>
@@ -8847,6 +9027,36 @@
           <a:noFill/>
         </p:spPr>
       </p:pic>
+      <p:pic>
+        <p:nvPicPr>
+          <p:cNvPr id="7" name="Imagen 6"/>
+          <p:cNvPicPr>
+            <a:picLocks noChangeAspect="1"/>
+          </p:cNvPicPr>
+          <p:nvPr/>
+        </p:nvPicPr>
+        <p:blipFill>
+          <a:blip r:embed="rId3">
+            <a:extLst>
+              <a:ext uri="{28A0092B-C50C-407E-A947-70E740481C1C}">
+                <a14:useLocalDpi xmlns:a14="http://schemas.microsoft.com/office/drawing/2010/main" val="0"/>
+              </a:ext>
+            </a:extLst>
+          </a:blip>
+          <a:stretch>
+            <a:fillRect/>
+          </a:stretch>
+        </p:blipFill>
+        <p:spPr>
+          <a:xfrm>
+            <a:off x="4211960" y="6137668"/>
+            <a:ext cx="2137420" cy="669725"/>
+          </a:xfrm>
+          <a:prstGeom prst="rect">
+            <a:avLst/>
+          </a:prstGeom>
+        </p:spPr>
+      </p:pic>
     </p:spTree>
     <p:extLst>
       <p:ext uri="{BB962C8B-B14F-4D97-AF65-F5344CB8AC3E}">
@@ -9002,6 +9212,36 @@
             <a:avLst/>
           </a:prstGeom>
           <a:noFill/>
+        </p:spPr>
+      </p:pic>
+      <p:pic>
+        <p:nvPicPr>
+          <p:cNvPr id="7" name="Imagen 6"/>
+          <p:cNvPicPr>
+            <a:picLocks noChangeAspect="1"/>
+          </p:cNvPicPr>
+          <p:nvPr/>
+        </p:nvPicPr>
+        <p:blipFill>
+          <a:blip r:embed="rId3">
+            <a:extLst>
+              <a:ext uri="{28A0092B-C50C-407E-A947-70E740481C1C}">
+                <a14:useLocalDpi xmlns:a14="http://schemas.microsoft.com/office/drawing/2010/main" val="0"/>
+              </a:ext>
+            </a:extLst>
+          </a:blip>
+          <a:stretch>
+            <a:fillRect/>
+          </a:stretch>
+        </p:blipFill>
+        <p:spPr>
+          <a:xfrm>
+            <a:off x="4211960" y="6137668"/>
+            <a:ext cx="2137420" cy="669725"/>
+          </a:xfrm>
+          <a:prstGeom prst="rect">
+            <a:avLst/>
+          </a:prstGeom>
         </p:spPr>
       </p:pic>
     </p:spTree>
@@ -9848,11 +10088,7 @@
             </a:r>
             <a:r>
               <a:rPr lang="es-ES" sz="2000" dirty="0" smtClean="0"/>
-              <a:t> </a:t>
-            </a:r>
-            <a:r>
-              <a:rPr lang="es-ES" sz="2000" dirty="0" smtClean="0"/>
-              <a:t>performance</a:t>
+              <a:t> performance</a:t>
             </a:r>
             <a:endParaRPr lang="en-US" b="1" dirty="0"/>
           </a:p>
@@ -9945,19 +10181,7 @@
                   </a:outerShdw>
                 </a:effectLst>
               </a:rPr>
-              <a:t>KNN </a:t>
-            </a:r>
-            <a:r>
-              <a:rPr lang="es-ES" sz="1600" b="1" dirty="0" smtClean="0">
-                <a:effectLst>
-                  <a:outerShdw blurRad="38100" dist="38100" dir="2700000" algn="tl">
-                    <a:srgbClr val="000000">
-                      <a:alpha val="43137"/>
-                    </a:srgbClr>
-                  </a:outerShdw>
-                </a:effectLst>
-              </a:rPr>
-              <a:t>(k=30): </a:t>
+              <a:t>KNN (k=30): </a:t>
             </a:r>
             <a:r>
               <a:rPr lang="es-ES" sz="1600" dirty="0" smtClean="0"/>
@@ -10117,6 +10341,36 @@
           </a:p>
         </p:txBody>
       </p:sp>
+      <p:pic>
+        <p:nvPicPr>
+          <p:cNvPr id="15" name="Imagen 14"/>
+          <p:cNvPicPr>
+            <a:picLocks noChangeAspect="1"/>
+          </p:cNvPicPr>
+          <p:nvPr/>
+        </p:nvPicPr>
+        <p:blipFill>
+          <a:blip r:embed="rId3">
+            <a:extLst>
+              <a:ext uri="{28A0092B-C50C-407E-A947-70E740481C1C}">
+                <a14:useLocalDpi xmlns:a14="http://schemas.microsoft.com/office/drawing/2010/main" val="0"/>
+              </a:ext>
+            </a:extLst>
+          </a:blip>
+          <a:stretch>
+            <a:fillRect/>
+          </a:stretch>
+        </p:blipFill>
+        <p:spPr>
+          <a:xfrm>
+            <a:off x="4211960" y="6137668"/>
+            <a:ext cx="2137420" cy="669725"/>
+          </a:xfrm>
+          <a:prstGeom prst="rect">
+            <a:avLst/>
+          </a:prstGeom>
+        </p:spPr>
+      </p:pic>
     </p:spTree>
     <p:extLst>
       <p:ext uri="{BB962C8B-B14F-4D97-AF65-F5344CB8AC3E}">
@@ -10387,31 +10641,7 @@
                   </a:outerShdw>
                 </a:effectLst>
               </a:rPr>
-              <a:t>KNN </a:t>
-            </a:r>
-            <a:r>
-              <a:rPr lang="es-ES" sz="2000" b="1" dirty="0" smtClean="0">
-                <a:effectLst>
-                  <a:outerShdw blurRad="38100" dist="38100" dir="2700000" algn="tl">
-                    <a:srgbClr val="000000">
-                      <a:alpha val="43137"/>
-                    </a:srgbClr>
-                  </a:outerShdw>
-                </a:effectLst>
-              </a:rPr>
-              <a:t>(k=30</a:t>
-            </a:r>
-            <a:r>
-              <a:rPr lang="es-ES" sz="2000" b="1" dirty="0" smtClean="0">
-                <a:effectLst>
-                  <a:outerShdw blurRad="38100" dist="38100" dir="2700000" algn="tl">
-                    <a:srgbClr val="000000">
-                      <a:alpha val="43137"/>
-                    </a:srgbClr>
-                  </a:outerShdw>
-                </a:effectLst>
-              </a:rPr>
-              <a:t>)</a:t>
+              <a:t>KNN (k=30)</a:t>
             </a:r>
             <a:endParaRPr lang="en-US" sz="3200" dirty="0"/>
           </a:p>
@@ -10521,6 +10751,36 @@
           </a:p>
         </p:txBody>
       </p:sp>
+      <p:pic>
+        <p:nvPicPr>
+          <p:cNvPr id="9" name="Imagen 8"/>
+          <p:cNvPicPr>
+            <a:picLocks noChangeAspect="1"/>
+          </p:cNvPicPr>
+          <p:nvPr/>
+        </p:nvPicPr>
+        <p:blipFill>
+          <a:blip r:embed="rId2">
+            <a:extLst>
+              <a:ext uri="{28A0092B-C50C-407E-A947-70E740481C1C}">
+                <a14:useLocalDpi xmlns:a14="http://schemas.microsoft.com/office/drawing/2010/main" val="0"/>
+              </a:ext>
+            </a:extLst>
+          </a:blip>
+          <a:stretch>
+            <a:fillRect/>
+          </a:stretch>
+        </p:blipFill>
+        <p:spPr>
+          <a:xfrm>
+            <a:off x="4211960" y="6137668"/>
+            <a:ext cx="2137420" cy="669725"/>
+          </a:xfrm>
+          <a:prstGeom prst="rect">
+            <a:avLst/>
+          </a:prstGeom>
+        </p:spPr>
+      </p:pic>
     </p:spTree>
     <p:extLst>
       <p:ext uri="{BB962C8B-B14F-4D97-AF65-F5344CB8AC3E}">
@@ -10630,6 +10890,36 @@
           </a:p>
         </p:txBody>
       </p:sp>
+      <p:pic>
+        <p:nvPicPr>
+          <p:cNvPr id="6" name="Imagen 5"/>
+          <p:cNvPicPr>
+            <a:picLocks noChangeAspect="1"/>
+          </p:cNvPicPr>
+          <p:nvPr/>
+        </p:nvPicPr>
+        <p:blipFill>
+          <a:blip r:embed="rId2">
+            <a:extLst>
+              <a:ext uri="{28A0092B-C50C-407E-A947-70E740481C1C}">
+                <a14:useLocalDpi xmlns:a14="http://schemas.microsoft.com/office/drawing/2010/main" val="0"/>
+              </a:ext>
+            </a:extLst>
+          </a:blip>
+          <a:stretch>
+            <a:fillRect/>
+          </a:stretch>
+        </p:blipFill>
+        <p:spPr>
+          <a:xfrm>
+            <a:off x="2446454" y="1772816"/>
+            <a:ext cx="4136629" cy="1296144"/>
+          </a:xfrm>
+          <a:prstGeom prst="rect">
+            <a:avLst/>
+          </a:prstGeom>
+        </p:spPr>
+      </p:pic>
     </p:spTree>
     <p:extLst>
       <p:ext uri="{BB962C8B-B14F-4D97-AF65-F5344CB8AC3E}">
@@ -10773,11 +11063,7 @@
           <a:p>
             <a:r>
               <a:rPr lang="nl-NL" dirty="0" smtClean="0"/>
-              <a:t>Our </a:t>
-            </a:r>
-            <a:r>
-              <a:rPr lang="nl-NL" dirty="0" smtClean="0"/>
-              <a:t>work</a:t>
+              <a:t>Our work</a:t>
             </a:r>
             <a:endParaRPr lang="nl-NL" b="1" dirty="0">
               <a:effectLst>
@@ -10854,6 +11140,36 @@
           </a:p>
         </p:txBody>
       </p:sp>
+      <p:pic>
+        <p:nvPicPr>
+          <p:cNvPr id="8" name="Imagen 7"/>
+          <p:cNvPicPr>
+            <a:picLocks noChangeAspect="1"/>
+          </p:cNvPicPr>
+          <p:nvPr/>
+        </p:nvPicPr>
+        <p:blipFill>
+          <a:blip r:embed="rId2">
+            <a:extLst>
+              <a:ext uri="{28A0092B-C50C-407E-A947-70E740481C1C}">
+                <a14:useLocalDpi xmlns:a14="http://schemas.microsoft.com/office/drawing/2010/main" val="0"/>
+              </a:ext>
+            </a:extLst>
+          </a:blip>
+          <a:stretch>
+            <a:fillRect/>
+          </a:stretch>
+        </p:blipFill>
+        <p:spPr>
+          <a:xfrm>
+            <a:off x="4211960" y="6137668"/>
+            <a:ext cx="2137420" cy="669725"/>
+          </a:xfrm>
+          <a:prstGeom prst="rect">
+            <a:avLst/>
+          </a:prstGeom>
+        </p:spPr>
+      </p:pic>
     </p:spTree>
   </p:cSld>
   <p:clrMapOvr>
@@ -11291,6 +11607,36 @@
           <a:xfrm>
             <a:off x="899592" y="1329524"/>
             <a:ext cx="7315215" cy="3657607"/>
+          </a:xfrm>
+          <a:prstGeom prst="rect">
+            <a:avLst/>
+          </a:prstGeom>
+        </p:spPr>
+      </p:pic>
+      <p:pic>
+        <p:nvPicPr>
+          <p:cNvPr id="13" name="Imagen 12"/>
+          <p:cNvPicPr>
+            <a:picLocks noChangeAspect="1"/>
+          </p:cNvPicPr>
+          <p:nvPr/>
+        </p:nvPicPr>
+        <p:blipFill>
+          <a:blip r:embed="rId5">
+            <a:extLst>
+              <a:ext uri="{28A0092B-C50C-407E-A947-70E740481C1C}">
+                <a14:useLocalDpi xmlns:a14="http://schemas.microsoft.com/office/drawing/2010/main" val="0"/>
+              </a:ext>
+            </a:extLst>
+          </a:blip>
+          <a:stretch>
+            <a:fillRect/>
+          </a:stretch>
+        </p:blipFill>
+        <p:spPr>
+          <a:xfrm>
+            <a:off x="4211960" y="6137668"/>
+            <a:ext cx="2137420" cy="669725"/>
           </a:xfrm>
           <a:prstGeom prst="rect">
             <a:avLst/>
@@ -12115,6 +12461,36 @@
           </a:p>
         </p:txBody>
       </p:sp>
+      <p:pic>
+        <p:nvPicPr>
+          <p:cNvPr id="16" name="Imagen 15"/>
+          <p:cNvPicPr>
+            <a:picLocks noChangeAspect="1"/>
+          </p:cNvPicPr>
+          <p:nvPr/>
+        </p:nvPicPr>
+        <p:blipFill>
+          <a:blip r:embed="rId8">
+            <a:extLst>
+              <a:ext uri="{28A0092B-C50C-407E-A947-70E740481C1C}">
+                <a14:useLocalDpi xmlns:a14="http://schemas.microsoft.com/office/drawing/2010/main" val="0"/>
+              </a:ext>
+            </a:extLst>
+          </a:blip>
+          <a:stretch>
+            <a:fillRect/>
+          </a:stretch>
+        </p:blipFill>
+        <p:spPr>
+          <a:xfrm>
+            <a:off x="4211960" y="6137668"/>
+            <a:ext cx="2137420" cy="669725"/>
+          </a:xfrm>
+          <a:prstGeom prst="rect">
+            <a:avLst/>
+          </a:prstGeom>
+        </p:spPr>
+      </p:pic>
     </p:spTree>
     <p:extLst>
       <p:ext uri="{BB962C8B-B14F-4D97-AF65-F5344CB8AC3E}">
@@ -13612,6 +13988,36 @@
           </a:p>
         </p:txBody>
       </p:sp>
+      <p:pic>
+        <p:nvPicPr>
+          <p:cNvPr id="16" name="Imagen 15"/>
+          <p:cNvPicPr>
+            <a:picLocks noChangeAspect="1"/>
+          </p:cNvPicPr>
+          <p:nvPr/>
+        </p:nvPicPr>
+        <p:blipFill>
+          <a:blip r:embed="rId3">
+            <a:extLst>
+              <a:ext uri="{28A0092B-C50C-407E-A947-70E740481C1C}">
+                <a14:useLocalDpi xmlns:a14="http://schemas.microsoft.com/office/drawing/2010/main" val="0"/>
+              </a:ext>
+            </a:extLst>
+          </a:blip>
+          <a:stretch>
+            <a:fillRect/>
+          </a:stretch>
+        </p:blipFill>
+        <p:spPr>
+          <a:xfrm>
+            <a:off x="4211960" y="6137668"/>
+            <a:ext cx="2137420" cy="669725"/>
+          </a:xfrm>
+          <a:prstGeom prst="rect">
+            <a:avLst/>
+          </a:prstGeom>
+        </p:spPr>
+      </p:pic>
     </p:spTree>
     <p:extLst>
       <p:ext uri="{BB962C8B-B14F-4D97-AF65-F5344CB8AC3E}">
@@ -14494,6 +14900,36 @@
           </a:p>
         </p:txBody>
       </p:sp>
+      <p:pic>
+        <p:nvPicPr>
+          <p:cNvPr id="18" name="Imagen 17"/>
+          <p:cNvPicPr>
+            <a:picLocks noChangeAspect="1"/>
+          </p:cNvPicPr>
+          <p:nvPr/>
+        </p:nvPicPr>
+        <p:blipFill>
+          <a:blip r:embed="rId5">
+            <a:extLst>
+              <a:ext uri="{28A0092B-C50C-407E-A947-70E740481C1C}">
+                <a14:useLocalDpi xmlns:a14="http://schemas.microsoft.com/office/drawing/2010/main" val="0"/>
+              </a:ext>
+            </a:extLst>
+          </a:blip>
+          <a:stretch>
+            <a:fillRect/>
+          </a:stretch>
+        </p:blipFill>
+        <p:spPr>
+          <a:xfrm>
+            <a:off x="4211960" y="6137668"/>
+            <a:ext cx="2137420" cy="669725"/>
+          </a:xfrm>
+          <a:prstGeom prst="rect">
+            <a:avLst/>
+          </a:prstGeom>
+        </p:spPr>
+      </p:pic>
     </p:spTree>
     <p:extLst>
       <p:ext uri="{BB962C8B-B14F-4D97-AF65-F5344CB8AC3E}">
@@ -15101,6 +15537,36 @@
           </a:p>
         </p:txBody>
       </p:sp>
+      <p:pic>
+        <p:nvPicPr>
+          <p:cNvPr id="9" name="Imagen 8"/>
+          <p:cNvPicPr>
+            <a:picLocks noChangeAspect="1"/>
+          </p:cNvPicPr>
+          <p:nvPr/>
+        </p:nvPicPr>
+        <p:blipFill>
+          <a:blip r:embed="rId2">
+            <a:extLst>
+              <a:ext uri="{28A0092B-C50C-407E-A947-70E740481C1C}">
+                <a14:useLocalDpi xmlns:a14="http://schemas.microsoft.com/office/drawing/2010/main" val="0"/>
+              </a:ext>
+            </a:extLst>
+          </a:blip>
+          <a:stretch>
+            <a:fillRect/>
+          </a:stretch>
+        </p:blipFill>
+        <p:spPr>
+          <a:xfrm>
+            <a:off x="4211960" y="6137668"/>
+            <a:ext cx="2137420" cy="669725"/>
+          </a:xfrm>
+          <a:prstGeom prst="rect">
+            <a:avLst/>
+          </a:prstGeom>
+        </p:spPr>
+      </p:pic>
     </p:spTree>
     <p:extLst>
       <p:ext uri="{BB962C8B-B14F-4D97-AF65-F5344CB8AC3E}">
@@ -15472,6 +15938,36 @@
           <a:effectLst/>
         </p:spPr>
       </p:cxnSp>
+      <p:pic>
+        <p:nvPicPr>
+          <p:cNvPr id="8" name="Imagen 7"/>
+          <p:cNvPicPr>
+            <a:picLocks noChangeAspect="1"/>
+          </p:cNvPicPr>
+          <p:nvPr/>
+        </p:nvPicPr>
+        <p:blipFill>
+          <a:blip r:embed="rId4">
+            <a:extLst>
+              <a:ext uri="{28A0092B-C50C-407E-A947-70E740481C1C}">
+                <a14:useLocalDpi xmlns:a14="http://schemas.microsoft.com/office/drawing/2010/main" val="0"/>
+              </a:ext>
+            </a:extLst>
+          </a:blip>
+          <a:stretch>
+            <a:fillRect/>
+          </a:stretch>
+        </p:blipFill>
+        <p:spPr>
+          <a:xfrm>
+            <a:off x="4211960" y="6137668"/>
+            <a:ext cx="2137420" cy="669725"/>
+          </a:xfrm>
+          <a:prstGeom prst="rect">
+            <a:avLst/>
+          </a:prstGeom>
+        </p:spPr>
+      </p:pic>
     </p:spTree>
     <p:extLst>
       <p:ext uri="{BB962C8B-B14F-4D97-AF65-F5344CB8AC3E}">
@@ -15637,6 +16133,36 @@
           <a:xfrm>
             <a:off x="1524000" y="1143000"/>
             <a:ext cx="6096000" cy="4572000"/>
+          </a:xfrm>
+          <a:prstGeom prst="rect">
+            <a:avLst/>
+          </a:prstGeom>
+        </p:spPr>
+      </p:pic>
+      <p:pic>
+        <p:nvPicPr>
+          <p:cNvPr id="7" name="Imagen 6"/>
+          <p:cNvPicPr>
+            <a:picLocks noChangeAspect="1"/>
+          </p:cNvPicPr>
+          <p:nvPr/>
+        </p:nvPicPr>
+        <p:blipFill>
+          <a:blip r:embed="rId3">
+            <a:extLst>
+              <a:ext uri="{28A0092B-C50C-407E-A947-70E740481C1C}">
+                <a14:useLocalDpi xmlns:a14="http://schemas.microsoft.com/office/drawing/2010/main" val="0"/>
+              </a:ext>
+            </a:extLst>
+          </a:blip>
+          <a:stretch>
+            <a:fillRect/>
+          </a:stretch>
+        </p:blipFill>
+        <p:spPr>
+          <a:xfrm>
+            <a:off x="4211960" y="6137668"/>
+            <a:ext cx="2137420" cy="669725"/>
           </a:xfrm>
           <a:prstGeom prst="rect">
             <a:avLst/>

</xml_diff>